<commit_message>
Updated Lecture, Added new dataset
</commit_message>
<xml_diff>
--- a/Syllabus/Lecture08/Lec08.pptx
+++ b/Syllabus/Lecture08/Lec08.pptx
@@ -325,7 +325,7 @@
           <a:p>
             <a:fld id="{DF9C6931-D0F6-AB40-9D7F-95567148A5C2}" type="datetimeFigureOut">
               <a:rPr lang="en-US" smtClean="0"/>
-              <a:t>9/20/22</a:t>
+              <a:t>9/21/22</a:t>
             </a:fld>
             <a:endParaRPr lang="en-US"/>
           </a:p>
@@ -820,7 +820,7 @@
           <a:p>
             <a:fld id="{736C18F2-6801-5147-A332-A6E1C7D69D18}" type="datetimeFigureOut">
               <a:rPr lang="en-US" smtClean="0"/>
-              <a:t>9/20/22</a:t>
+              <a:t>9/21/22</a:t>
             </a:fld>
             <a:endParaRPr lang="en-US"/>
           </a:p>
@@ -1425,6 +1425,10 @@
               <a:tabLst/>
               <a:defRPr/>
             </a:pPr>
+            <a:r>
+              <a:rPr lang="en-US" altLang="en-US"/>
+              <a:t>Kronecker Function</a:t>
+            </a:r>
             <a:endParaRPr lang="en-US" altLang="en-US" dirty="0"/>
           </a:p>
           <a:p>
@@ -12694,15 +12698,22 @@
             <a:pPr algn="ctr"/>
             <a:r>
               <a:rPr lang="en-US" altLang="en-US" b="1" dirty="0"/>
-              <a:t>Given a query, assign majority category label of its </a:t>
+              <a:t>Given a query, assign majority category label of its</a:t>
+            </a:r>
+          </a:p>
+          <a:p>
+            <a:pPr algn="ctr"/>
+            <a:r>
+              <a:rPr lang="en-US" altLang="en-US" b="1" dirty="0"/>
+              <a:t> </a:t>
             </a:r>
             <a:r>
               <a:rPr lang="en-US" altLang="en-US" b="1" i="1" dirty="0"/>
-              <a:t>k</a:t>
+              <a:t>k-</a:t>
             </a:r>
             <a:r>
               <a:rPr lang="en-US" altLang="en-US" b="1" dirty="0"/>
-              <a:t> nearest training samples</a:t>
+              <a:t>nearest training samples</a:t>
             </a:r>
           </a:p>
           <a:p>
@@ -18232,50 +18243,6 @@
               <a:t>K-Nearest Neighbors</a:t>
             </a:r>
           </a:p>
-          <a:p>
-            <a:pPr marL="1066785" lvl="1" indent="-457200">
-              <a:buFont typeface="Arial" panose="020B0604020202020204" pitchFamily="34" charset="0"/>
-              <a:buChar char="•"/>
-            </a:pPr>
-            <a:r>
-              <a:rPr lang="en-US" dirty="0"/>
-              <a:t>Theory: 40-45 mins</a:t>
-            </a:r>
-          </a:p>
-          <a:p>
-            <a:pPr marL="1066785" lvl="1" indent="-457200">
-              <a:buFont typeface="Arial" panose="020B0604020202020204" pitchFamily="34" charset="0"/>
-              <a:buChar char="•"/>
-            </a:pPr>
-            <a:r>
-              <a:rPr lang="en-US" dirty="0"/>
-              <a:t>Online code demo – 15-20 mins</a:t>
-            </a:r>
-          </a:p>
-          <a:p>
-            <a:pPr marL="1066785" lvl="1" indent="-457200">
-              <a:buFont typeface="Arial" panose="020B0604020202020204" pitchFamily="34" charset="0"/>
-              <a:buChar char="•"/>
-            </a:pPr>
-            <a:r>
-              <a:rPr lang="en-US" dirty="0"/>
-              <a:t>Pop-quiz - 10 mins</a:t>
-            </a:r>
-          </a:p>
-          <a:p>
-            <a:pPr marL="457200" indent="-457200">
-              <a:buFont typeface="Arial" panose="020B0604020202020204" pitchFamily="34" charset="0"/>
-              <a:buChar char="•"/>
-            </a:pPr>
-            <a:r>
-              <a:rPr lang="en-US" dirty="0"/>
-              <a:t>Office hours until 10:15am</a:t>
-            </a:r>
-          </a:p>
-          <a:p>
-            <a:pPr lvl="1"/>
-            <a:endParaRPr lang="en-US" dirty="0"/>
-          </a:p>
         </p:txBody>
       </p:sp>
     </p:spTree>
@@ -21379,20 +21346,12 @@
           <a:lstStyle/>
           <a:p>
             <a:r>
-              <a:rPr lang="en-US" sz="4000" b="1" dirty="0">
+              <a:rPr lang="en-US" sz="4000" b="1">
                 <a:solidFill>
                   <a:srgbClr val="E46102"/>
                 </a:solidFill>
               </a:rPr>
-              <a:t>Weighted </a:t>
-            </a:r>
-            <a:r>
-              <a:rPr lang="en-US" sz="4000" b="1" dirty="0" err="1">
-                <a:solidFill>
-                  <a:srgbClr val="E46102"/>
-                </a:solidFill>
-              </a:rPr>
-              <a:t>kNN</a:t>
+              <a:t>Weighted k-NN</a:t>
             </a:r>
             <a:endParaRPr sz="4000" b="1" dirty="0">
               <a:solidFill>

</xml_diff>